<commit_message>
add FII Practic logo to presentations
</commit_message>
<xml_diff>
--- a/FII.Practic.Maven.Levi9.March.2016.pptx
+++ b/FII.Practic.Maven.Levi9.March.2016.pptx
@@ -228,7 +228,7 @@
           <a:p>
             <a:fld id="{4BEF8651-3ED7-4908-89A0-BE7A233C7155}" type="datetimeFigureOut">
               <a:rPr lang="en-US" smtClean="0"/>
-              <a:t>3/8/2016</a:t>
+              <a:t>3/9/2016</a:t>
             </a:fld>
             <a:endParaRPr lang="en-US"/>
           </a:p>
@@ -3660,39 +3660,6 @@
       </p:grpSpPr>
       <p:sp>
         <p:nvSpPr>
-          <p:cNvPr id="9" name="Subtitle"/>
-          <p:cNvSpPr>
-            <a:spLocks noGrp="1"/>
-          </p:cNvSpPr>
-          <p:nvPr>
-            <p:ph type="subTitle" idx="1"/>
-          </p:nvPr>
-        </p:nvSpPr>
-        <p:spPr/>
-        <p:txBody>
-          <a:bodyPr>
-            <a:normAutofit/>
-          </a:bodyPr>
-          <a:lstStyle/>
-          <a:p>
-            <a:r>
-              <a:rPr lang="ro-RO" smtClean="0"/>
-              <a:t>FII Practic</a:t>
-            </a:r>
-            <a:r>
-              <a:rPr lang="en-US" smtClean="0"/>
-              <a:t> </a:t>
-            </a:r>
-            <a:r>
-              <a:rPr lang="en-US" dirty="0" smtClean="0"/>
-              <a:t>- 2016</a:t>
-            </a:r>
-            <a:endParaRPr lang="en-US" dirty="0"/>
-          </a:p>
-        </p:txBody>
-      </p:sp>
-      <p:sp>
-        <p:nvSpPr>
           <p:cNvPr id="8" name="Title"/>
           <p:cNvSpPr>
             <a:spLocks noGrp="1"/>
@@ -3737,6 +3704,36 @@
           </a:p>
         </p:txBody>
       </p:sp>
+      <p:pic>
+        <p:nvPicPr>
+          <p:cNvPr id="2" name="Picture 1"/>
+          <p:cNvPicPr>
+            <a:picLocks noChangeAspect="1"/>
+          </p:cNvPicPr>
+          <p:nvPr/>
+        </p:nvPicPr>
+        <p:blipFill>
+          <a:blip r:embed="rId2">
+            <a:extLst>
+              <a:ext uri="{28A0092B-C50C-407E-A947-70E740481C1C}">
+                <a14:useLocalDpi xmlns:a14="http://schemas.microsoft.com/office/drawing/2010/main" val="0"/>
+              </a:ext>
+            </a:extLst>
+          </a:blip>
+          <a:stretch>
+            <a:fillRect/>
+          </a:stretch>
+        </p:blipFill>
+        <p:spPr>
+          <a:xfrm>
+            <a:off x="3089353" y="5211018"/>
+            <a:ext cx="2945416" cy="1342935"/>
+          </a:xfrm>
+          <a:prstGeom prst="rect">
+            <a:avLst/>
+          </a:prstGeom>
+        </p:spPr>
+      </p:pic>
     </p:spTree>
     <p:extLst>
       <p:ext uri="{BB962C8B-B14F-4D97-AF65-F5344CB8AC3E}">
@@ -5807,22 +5804,53 @@
 </file>
 
 <file path=customXml/item1.xml><?xml version="1.0" encoding="utf-8"?>
-<p:properties xmlns:p="http://schemas.microsoft.com/office/2006/metadata/properties" xmlns:xsi="http://www.w3.org/2001/XMLSchema-instance" xmlns:pc="http://schemas.microsoft.com/office/infopath/2007/PartnerControls">
-  <documentManagement>
-    <TemplateUrl xmlns="http://schemas.microsoft.com/sharepoint/v3" xsi:nil="true"/>
-    <_SourceUrl xmlns="http://schemas.microsoft.com/sharepoint/v3" xsi:nil="true"/>
-    <xd_ProgID xmlns="http://schemas.microsoft.com/sharepoint/v3" xsi:nil="true"/>
-    <Order xmlns="http://schemas.microsoft.com/sharepoint/v3" xsi:nil="true"/>
-    <_SharedFileIndex xmlns="http://schemas.microsoft.com/sharepoint/v3" xsi:nil="true"/>
-    <MetaInfo xmlns="http://schemas.microsoft.com/sharepoint/v3" xsi:nil="true"/>
-    <ContentTypeId xmlns="http://schemas.microsoft.com/sharepoint/v3">0x010100E25DA1609B7607469C1AC9B6F8A6FE9D</ContentTypeId>
-    <_dlc_DocId xmlns="696890a7-2738-473a-8580-15948eca3069">Y5ANCCKZ2MDQ-10-1542</_dlc_DocId>
-    <_dlc_DocIdUrl xmlns="696890a7-2738-473a-8580-15948eca3069">
-      <Url>https://internal.levi9.com/_layouts/15/DocIdRedir.aspx?ID=Y5ANCCKZ2MDQ-10-1542</Url>
-      <Description>Y5ANCCKZ2MDQ-10-1542</Description>
-    </_dlc_DocIdUrl>
-  </documentManagement>
-</p:properties>
+<?mso-contentType ?>
+<spe:Receivers xmlns:spe="http://schemas.microsoft.com/sharepoint/events">
+  <Receiver>
+    <Name>Document ID Generator</Name>
+    <Synchronization>Synchronous</Synchronization>
+    <Type>10001</Type>
+    <SequenceNumber>1000</SequenceNumber>
+    <Url/>
+    <Assembly>Microsoft.Office.DocumentManagement, Version=15.0.0.0, Culture=neutral, PublicKeyToken=71e9bce111e9429c</Assembly>
+    <Class>Microsoft.Office.DocumentManagement.Internal.DocIdHandler</Class>
+    <Data/>
+    <Filter/>
+  </Receiver>
+  <Receiver>
+    <Name>Document ID Generator</Name>
+    <Synchronization>Synchronous</Synchronization>
+    <Type>10002</Type>
+    <SequenceNumber>1001</SequenceNumber>
+    <Url/>
+    <Assembly>Microsoft.Office.DocumentManagement, Version=15.0.0.0, Culture=neutral, PublicKeyToken=71e9bce111e9429c</Assembly>
+    <Class>Microsoft.Office.DocumentManagement.Internal.DocIdHandler</Class>
+    <Data/>
+    <Filter/>
+  </Receiver>
+  <Receiver>
+    <Name>Document ID Generator</Name>
+    <Synchronization>Synchronous</Synchronization>
+    <Type>10004</Type>
+    <SequenceNumber>1002</SequenceNumber>
+    <Url/>
+    <Assembly>Microsoft.Office.DocumentManagement, Version=15.0.0.0, Culture=neutral, PublicKeyToken=71e9bce111e9429c</Assembly>
+    <Class>Microsoft.Office.DocumentManagement.Internal.DocIdHandler</Class>
+    <Data/>
+    <Filter/>
+  </Receiver>
+  <Receiver>
+    <Name>Document ID Generator</Name>
+    <Synchronization>Synchronous</Synchronization>
+    <Type>10006</Type>
+    <SequenceNumber>1003</SequenceNumber>
+    <Url/>
+    <Assembly>Microsoft.Office.DocumentManagement, Version=15.0.0.0, Culture=neutral, PublicKeyToken=71e9bce111e9429c</Assembly>
+    <Class>Microsoft.Office.DocumentManagement.Internal.DocIdHandler</Class>
+    <Data/>
+    <Filter/>
+  </Receiver>
+</spe:Receivers>
 </file>
 
 <file path=customXml/item2.xml><?xml version="1.0" encoding="utf-8"?>
@@ -6318,53 +6346,22 @@
 </file>
 
 <file path=customXml/item3.xml><?xml version="1.0" encoding="utf-8"?>
-<?mso-contentType ?>
-<spe:Receivers xmlns:spe="http://schemas.microsoft.com/sharepoint/events">
-  <Receiver>
-    <Name>Document ID Generator</Name>
-    <Synchronization>Synchronous</Synchronization>
-    <Type>10001</Type>
-    <SequenceNumber>1000</SequenceNumber>
-    <Url/>
-    <Assembly>Microsoft.Office.DocumentManagement, Version=15.0.0.0, Culture=neutral, PublicKeyToken=71e9bce111e9429c</Assembly>
-    <Class>Microsoft.Office.DocumentManagement.Internal.DocIdHandler</Class>
-    <Data/>
-    <Filter/>
-  </Receiver>
-  <Receiver>
-    <Name>Document ID Generator</Name>
-    <Synchronization>Synchronous</Synchronization>
-    <Type>10002</Type>
-    <SequenceNumber>1001</SequenceNumber>
-    <Url/>
-    <Assembly>Microsoft.Office.DocumentManagement, Version=15.0.0.0, Culture=neutral, PublicKeyToken=71e9bce111e9429c</Assembly>
-    <Class>Microsoft.Office.DocumentManagement.Internal.DocIdHandler</Class>
-    <Data/>
-    <Filter/>
-  </Receiver>
-  <Receiver>
-    <Name>Document ID Generator</Name>
-    <Synchronization>Synchronous</Synchronization>
-    <Type>10004</Type>
-    <SequenceNumber>1002</SequenceNumber>
-    <Url/>
-    <Assembly>Microsoft.Office.DocumentManagement, Version=15.0.0.0, Culture=neutral, PublicKeyToken=71e9bce111e9429c</Assembly>
-    <Class>Microsoft.Office.DocumentManagement.Internal.DocIdHandler</Class>
-    <Data/>
-    <Filter/>
-  </Receiver>
-  <Receiver>
-    <Name>Document ID Generator</Name>
-    <Synchronization>Synchronous</Synchronization>
-    <Type>10006</Type>
-    <SequenceNumber>1003</SequenceNumber>
-    <Url/>
-    <Assembly>Microsoft.Office.DocumentManagement, Version=15.0.0.0, Culture=neutral, PublicKeyToken=71e9bce111e9429c</Assembly>
-    <Class>Microsoft.Office.DocumentManagement.Internal.DocIdHandler</Class>
-    <Data/>
-    <Filter/>
-  </Receiver>
-</spe:Receivers>
+<p:properties xmlns:p="http://schemas.microsoft.com/office/2006/metadata/properties" xmlns:xsi="http://www.w3.org/2001/XMLSchema-instance" xmlns:pc="http://schemas.microsoft.com/office/infopath/2007/PartnerControls">
+  <documentManagement>
+    <TemplateUrl xmlns="http://schemas.microsoft.com/sharepoint/v3" xsi:nil="true"/>
+    <_SourceUrl xmlns="http://schemas.microsoft.com/sharepoint/v3" xsi:nil="true"/>
+    <xd_ProgID xmlns="http://schemas.microsoft.com/sharepoint/v3" xsi:nil="true"/>
+    <Order xmlns="http://schemas.microsoft.com/sharepoint/v3" xsi:nil="true"/>
+    <_SharedFileIndex xmlns="http://schemas.microsoft.com/sharepoint/v3" xsi:nil="true"/>
+    <MetaInfo xmlns="http://schemas.microsoft.com/sharepoint/v3" xsi:nil="true"/>
+    <ContentTypeId xmlns="http://schemas.microsoft.com/sharepoint/v3">0x010100E25DA1609B7607469C1AC9B6F8A6FE9D</ContentTypeId>
+    <_dlc_DocId xmlns="696890a7-2738-473a-8580-15948eca3069">Y5ANCCKZ2MDQ-10-1542</_dlc_DocId>
+    <_dlc_DocIdUrl xmlns="696890a7-2738-473a-8580-15948eca3069">
+      <Url>https://internal.levi9.com/_layouts/15/DocIdRedir.aspx?ID=Y5ANCCKZ2MDQ-10-1542</Url>
+      <Description>Y5ANCCKZ2MDQ-10-1542</Description>
+    </_dlc_DocIdUrl>
+  </documentManagement>
+</p:properties>
 </file>
 
 <file path=customXml/item4.xml><?xml version="1.0" encoding="utf-8"?>
@@ -6377,18 +6374,9 @@
 </file>
 
 <file path=customXml/itemProps1.xml><?xml version="1.0" encoding="utf-8"?>
-<ds:datastoreItem xmlns:ds="http://schemas.openxmlformats.org/officeDocument/2006/customXml" ds:itemID="{61631425-235C-4781-93DD-7928AF7173EF}">
+<ds:datastoreItem xmlns:ds="http://schemas.openxmlformats.org/officeDocument/2006/customXml" ds:itemID="{DFBE2CE3-A764-49E9-945D-1AE464F7016A}">
   <ds:schemaRefs>
-    <ds:schemaRef ds:uri="http://purl.org/dc/elements/1.1/"/>
-    <ds:schemaRef ds:uri="696890a7-2738-473a-8580-15948eca3069"/>
-    <ds:schemaRef ds:uri="http://purl.org/dc/dcmitype/"/>
-    <ds:schemaRef ds:uri="http://schemas.microsoft.com/office/2006/documentManagement/types"/>
-    <ds:schemaRef ds:uri="http://www.w3.org/XML/1998/namespace"/>
-    <ds:schemaRef ds:uri="http://schemas.microsoft.com/office/2006/metadata/properties"/>
-    <ds:schemaRef ds:uri="http://schemas.openxmlformats.org/package/2006/metadata/core-properties"/>
-    <ds:schemaRef ds:uri="http://schemas.microsoft.com/office/infopath/2007/PartnerControls"/>
-    <ds:schemaRef ds:uri="http://schemas.microsoft.com/sharepoint/v3"/>
-    <ds:schemaRef ds:uri="http://purl.org/dc/terms/"/>
+    <ds:schemaRef ds:uri="http://schemas.microsoft.com/sharepoint/events"/>
   </ds:schemaRefs>
 </ds:datastoreItem>
 </file>
@@ -6413,9 +6401,18 @@
 </file>
 
 <file path=customXml/itemProps3.xml><?xml version="1.0" encoding="utf-8"?>
-<ds:datastoreItem xmlns:ds="http://schemas.openxmlformats.org/officeDocument/2006/customXml" ds:itemID="{DFBE2CE3-A764-49E9-945D-1AE464F7016A}">
+<ds:datastoreItem xmlns:ds="http://schemas.openxmlformats.org/officeDocument/2006/customXml" ds:itemID="{61631425-235C-4781-93DD-7928AF7173EF}">
   <ds:schemaRefs>
-    <ds:schemaRef ds:uri="http://schemas.microsoft.com/sharepoint/events"/>
+    <ds:schemaRef ds:uri="http://purl.org/dc/elements/1.1/"/>
+    <ds:schemaRef ds:uri="696890a7-2738-473a-8580-15948eca3069"/>
+    <ds:schemaRef ds:uri="http://purl.org/dc/dcmitype/"/>
+    <ds:schemaRef ds:uri="http://schemas.microsoft.com/office/2006/documentManagement/types"/>
+    <ds:schemaRef ds:uri="http://www.w3.org/XML/1998/namespace"/>
+    <ds:schemaRef ds:uri="http://schemas.microsoft.com/office/2006/metadata/properties"/>
+    <ds:schemaRef ds:uri="http://schemas.openxmlformats.org/package/2006/metadata/core-properties"/>
+    <ds:schemaRef ds:uri="http://schemas.microsoft.com/office/infopath/2007/PartnerControls"/>
+    <ds:schemaRef ds:uri="http://schemas.microsoft.com/sharepoint/v3"/>
+    <ds:schemaRef ds:uri="http://purl.org/dc/terms/"/>
   </ds:schemaRefs>
 </ds:datastoreItem>
 </file>

</xml_diff>